<commit_message>
Update turning to next page
</commit_message>
<xml_diff>
--- a/Slide/add all slides1.pptx
+++ b/Slide/add all slides1.pptx
@@ -3143,23 +3143,22 @@
           <a:lstStyle/>
           <a:p>
             <a:pPr>
-              <a:defRPr sz="1000">
-                <a:latin typeface="궁서"/>
+              <a:defRPr sz="3000">
+                <a:latin typeface="함초름돋음"/>
               </a:defRPr>
             </a:pPr>
             <a:r>
               <a:t>상처를 치료해줄 사람 어디 없나</a:t>
             </a:r>
+            <a:br/>
+            <a:r>
+              <a:t>가만히 놔두다간 끊임없이 덧나</a:t>
+            </a:r>
+            <a:br/>
             <a:r>
               <a:t/>
             </a:r>
           </a:p>
-          <a:p>
-            <a:r>
-              <a:t>가만히 놔두다간 끊임없이 덧나</a:t>
-            </a:r>
-          </a:p>
-          <a:p/>
         </p:txBody>
       </p:sp>
       <p:sp>
@@ -3213,23 +3212,22 @@
           <a:lstStyle/>
           <a:p>
             <a:pPr>
-              <a:defRPr sz="1000">
-                <a:latin typeface="궁서"/>
+              <a:defRPr sz="3000">
+                <a:latin typeface="함초름돋음"/>
               </a:defRPr>
             </a:pPr>
             <a:r>
               <a:t>방향감을 상실하고 길을 잃은 소리꾼</a:t>
             </a:r>
+            <a:br/>
+            <a:r>
+              <a:t>내 안에 숨어 있는 또 다른 나와 싸워</a:t>
+            </a:r>
+            <a:br/>
             <a:r>
               <a:t/>
             </a:r>
           </a:p>
-          <a:p>
-            <a:r>
-              <a:t>내 안에 숨어 있는 또 다른 나와 싸워</a:t>
-            </a:r>
-          </a:p>
-          <a:p/>
         </p:txBody>
       </p:sp>
       <p:sp>
@@ -3283,23 +3281,22 @@
           <a:lstStyle/>
           <a:p>
             <a:pPr>
-              <a:defRPr sz="1000">
-                <a:latin typeface="궁서"/>
+              <a:defRPr sz="3000">
+                <a:latin typeface="함초름돋음"/>
               </a:defRPr>
             </a:pPr>
             <a:r>
               <a:t>그녀가 떠나갈때 내게 말했었지</a:t>
             </a:r>
+            <a:br/>
+            <a:r>
+              <a:t>너는 곁에 있어도 있는 게 아닌것 같다고</a:t>
+            </a:r>
+            <a:br/>
             <a:r>
               <a:t/>
             </a:r>
           </a:p>
-          <a:p>
-            <a:r>
-              <a:t>너는 곁에 있어도 있는 게 아닌것 같다고</a:t>
-            </a:r>
-          </a:p>
-          <a:p/>
         </p:txBody>
       </p:sp>
       <p:sp>
@@ -3353,23 +3350,22 @@
           <a:lstStyle/>
           <a:p>
             <a:pPr>
-              <a:defRPr sz="1000">
-                <a:latin typeface="궁서"/>
+              <a:defRPr sz="3000">
+                <a:latin typeface="함초름돋음"/>
               </a:defRPr>
             </a:pPr>
             <a:r>
               <a:t>만지면 베어버리는 칼날같은 사람</a:t>
             </a:r>
+            <a:br/>
+            <a:r>
+              <a:t>심장이 얼어붙은 차가웠던 사랑</a:t>
+            </a:r>
+            <a:br/>
             <a:r>
               <a:t/>
             </a:r>
           </a:p>
-          <a:p>
-            <a:r>
-              <a:t>심장이 얼어붙은 차가웠던 사랑</a:t>
-            </a:r>
-          </a:p>
-          <a:p/>
         </p:txBody>
       </p:sp>
       <p:sp>
@@ -3423,23 +3419,22 @@
           <a:lstStyle/>
           <a:p>
             <a:pPr>
-              <a:defRPr sz="1000">
-                <a:latin typeface="궁서"/>
+              <a:defRPr sz="3000">
+                <a:latin typeface="함초름돋음"/>
               </a:defRPr>
             </a:pPr>
             <a:r>
               <a:t>그래 1분 1초가 사는게 사는게 아냐</a:t>
             </a:r>
+            <a:br/>
+            <a:r>
+              <a:t>매일 매일이 너무나 두려워</a:t>
+            </a:r>
+            <a:br/>
             <a:r>
               <a:t/>
             </a:r>
           </a:p>
-          <a:p>
-            <a:r>
-              <a:t>매일 매일이 너무나 두려워</a:t>
-            </a:r>
-          </a:p>
-          <a:p/>
         </p:txBody>
       </p:sp>
       <p:sp>
@@ -3493,19 +3488,19 @@
           <a:lstStyle/>
           <a:p>
             <a:pPr>
-              <a:defRPr sz="1000">
-                <a:latin typeface="궁서"/>
+              <a:defRPr sz="3000">
+                <a:latin typeface="함초름돋음"/>
               </a:defRPr>
             </a:pPr>
             <a:r>
               <a:t>M'aider누가 날 좀 꺼내줘</a:t>
             </a:r>
+            <a:br/>
+            <a:br/>
             <a:r>
               <a:t/>
             </a:r>
           </a:p>
-          <a:p/>
-          <a:p/>
         </p:txBody>
       </p:sp>
       <p:sp>
@@ -3559,23 +3554,22 @@
           <a:lstStyle/>
           <a:p>
             <a:pPr>
-              <a:defRPr sz="1000">
-                <a:latin typeface="궁서"/>
+              <a:defRPr sz="3000">
+                <a:latin typeface="함초름돋음"/>
               </a:defRPr>
             </a:pPr>
             <a:r>
               <a:t>언제나 외톨이 맘의 문을 닫고</a:t>
             </a:r>
+            <a:br/>
+            <a:r>
+              <a:t>슬픔을 등에 지고 살아가는 바보</a:t>
+            </a:r>
+            <a:br/>
             <a:r>
               <a:t/>
             </a:r>
           </a:p>
-          <a:p>
-            <a:r>
-              <a:t>슬픔을 등에 지고 살아가는 바보</a:t>
-            </a:r>
-          </a:p>
-          <a:p/>
         </p:txBody>
       </p:sp>
       <p:sp>
@@ -3629,23 +3623,22 @@
           <a:lstStyle/>
           <a:p>
             <a:pPr>
-              <a:defRPr sz="1000">
-                <a:latin typeface="궁서"/>
+              <a:defRPr sz="3000">
+                <a:latin typeface="함초름돋음"/>
               </a:defRPr>
             </a:pPr>
             <a:r>
               <a:t>두 눈을 감고 두 귀를 막고</a:t>
             </a:r>
+            <a:br/>
+            <a:r>
+              <a:t>캄캄한 어둠속에 내 자신을 가둬</a:t>
+            </a:r>
+            <a:br/>
             <a:r>
               <a:t/>
             </a:r>
           </a:p>
-          <a:p>
-            <a:r>
-              <a:t>캄캄한 어둠속에 내 자신을 가둬</a:t>
-            </a:r>
-          </a:p>
-          <a:p/>
         </p:txBody>
       </p:sp>
       <p:sp>
@@ -3698,21 +3691,20 @@
           <a:bodyPr/>
           <a:lstStyle/>
           <a:p>
+            <a:br/>
             <a:pPr>
-              <a:defRPr sz="1000">
-                <a:latin typeface="궁서"/>
+              <a:defRPr sz="3000">
+                <a:latin typeface="함초름돋음"/>
               </a:defRPr>
             </a:pPr>
             <a:r>
+              <a:t>언제나 외톨이 맘의 문을 닫고</a:t>
+            </a:r>
+            <a:br/>
+            <a:r>
               <a:t/>
             </a:r>
           </a:p>
-          <a:p>
-            <a:r>
-              <a:t>언제나 외톨이 맘의 문을 닫고</a:t>
-            </a:r>
-          </a:p>
-          <a:p/>
         </p:txBody>
       </p:sp>
       <p:sp>
@@ -3766,23 +3758,22 @@
           <a:lstStyle/>
           <a:p>
             <a:pPr>
-              <a:defRPr sz="1000">
-                <a:latin typeface="궁서"/>
+              <a:defRPr sz="3000">
+                <a:latin typeface="함초름돋음"/>
               </a:defRPr>
             </a:pPr>
             <a:r>
               <a:t>슬픔을 등에 지고 살아가는 바보</a:t>
             </a:r>
+            <a:br/>
+            <a:r>
+              <a:t>두 눈을 감고 두 귀를 막고</a:t>
+            </a:r>
+            <a:br/>
             <a:r>
               <a:t/>
             </a:r>
           </a:p>
-          <a:p>
-            <a:r>
-              <a:t>두 눈을 감고 두 귀를 막고</a:t>
-            </a:r>
-          </a:p>
-          <a:p/>
         </p:txBody>
       </p:sp>
       <p:sp>
@@ -3836,19 +3827,19 @@
           <a:lstStyle/>
           <a:p>
             <a:pPr>
-              <a:defRPr sz="1000">
-                <a:latin typeface="궁서"/>
+              <a:defRPr sz="3000">
+                <a:latin typeface="함초름돋음"/>
               </a:defRPr>
             </a:pPr>
             <a:r>
               <a:t>캄캄한 어둠속에 내 자신을 가둬</a:t>
             </a:r>
+            <a:br/>
+            <a:br/>
             <a:r>
               <a:t/>
             </a:r>
           </a:p>
-          <a:p/>
-          <a:p/>
         </p:txBody>
       </p:sp>
       <p:sp>
@@ -3902,23 +3893,22 @@
           <a:lstStyle/>
           <a:p>
             <a:pPr>
-              <a:defRPr sz="1000">
-                <a:latin typeface="궁서"/>
+              <a:defRPr sz="3000">
+                <a:latin typeface="함초름돋음"/>
               </a:defRPr>
             </a:pPr>
             <a:r>
               <a:t>사랑도 사람도 너무나도 겁나</a:t>
             </a:r>
+            <a:br/>
+            <a:r>
+              <a:t>혼자인게 무서워 난 잊혀질까 두려워</a:t>
+            </a:r>
+            <a:br/>
             <a:r>
               <a:t/>
             </a:r>
           </a:p>
-          <a:p>
-            <a:r>
-              <a:t>혼자인게 무서워 난 잊혀질까 두려워</a:t>
-            </a:r>
-          </a:p>
-          <a:p/>
         </p:txBody>
       </p:sp>
       <p:sp>
@@ -3972,23 +3962,22 @@
           <a:lstStyle/>
           <a:p>
             <a:pPr>
-              <a:defRPr sz="1000">
-                <a:latin typeface="궁서"/>
+              <a:defRPr sz="3000">
+                <a:latin typeface="함초름돋음"/>
               </a:defRPr>
             </a:pPr>
             <a:r>
               <a:t>아무도 모르게 다가온 이별에 대면했을때</a:t>
             </a:r>
+            <a:br/>
+            <a:r>
+              <a:t>또 다시 혼자가 되는게 두려워 외면했었네</a:t>
+            </a:r>
+            <a:br/>
             <a:r>
               <a:t/>
             </a:r>
           </a:p>
-          <a:p>
-            <a:r>
-              <a:t>또 다시 혼자가 되는게 두려워 외면했었네</a:t>
-            </a:r>
-          </a:p>
-          <a:p/>
         </p:txBody>
       </p:sp>
       <p:sp>
@@ -4042,23 +4031,22 @@
           <a:lstStyle/>
           <a:p>
             <a:pPr>
-              <a:defRPr sz="1000">
-                <a:latin typeface="궁서"/>
+              <a:defRPr sz="3000">
+                <a:latin typeface="함초름돋음"/>
               </a:defRPr>
             </a:pPr>
             <a:r>
               <a:t>꿈에도 그리던 지나간 시간이 다시금 내게로</a:t>
             </a:r>
+            <a:br/>
+            <a:r>
+              <a:t>되돌아오기를 바라며 간절한 맘으로 밤마다 기도했었네</a:t>
+            </a:r>
+            <a:br/>
             <a:r>
               <a:t/>
             </a:r>
           </a:p>
-          <a:p>
-            <a:r>
-              <a:t>되돌아오기를 바라며 간절한 맘으로 밤마다 기도했었네</a:t>
-            </a:r>
-          </a:p>
-          <a:p/>
         </p:txBody>
       </p:sp>
       <p:sp>
@@ -4111,21 +4099,20 @@
           <a:bodyPr/>
           <a:lstStyle/>
           <a:p>
+            <a:br/>
             <a:pPr>
-              <a:defRPr sz="1000">
-                <a:latin typeface="궁서"/>
+              <a:defRPr sz="3000">
+                <a:latin typeface="함초름돋음"/>
               </a:defRPr>
             </a:pPr>
             <a:r>
+              <a:t>시위를 당기고 내 손을 떠나간 추억의 화살이</a:t>
+            </a:r>
+            <a:br/>
+            <a:r>
               <a:t/>
             </a:r>
           </a:p>
-          <a:p>
-            <a:r>
-              <a:t>시위를 당기고 내 손을 떠나간 추억의 화살이</a:t>
-            </a:r>
-          </a:p>
-          <a:p/>
         </p:txBody>
       </p:sp>
       <p:sp>
@@ -4179,23 +4166,22 @@
           <a:lstStyle/>
           <a:p>
             <a:pPr>
-              <a:defRPr sz="1000">
-                <a:latin typeface="궁서"/>
+              <a:defRPr sz="3000">
+                <a:latin typeface="함초름돋음"/>
               </a:defRPr>
             </a:pPr>
             <a:r>
               <a:t>머나먼 과녁을 향해서 한없이 빠르게 날아가</a:t>
             </a:r>
+            <a:br/>
+            <a:r>
+              <a:t>내게로 돌아와 달라고 내 손을 붙잡아 달라고</a:t>
+            </a:r>
+            <a:br/>
             <a:r>
               <a:t/>
             </a:r>
           </a:p>
-          <a:p>
-            <a:r>
-              <a:t>내게로 돌아와 달라고 내 손을 붙잡아 달라고</a:t>
-            </a:r>
-          </a:p>
-          <a:p/>
         </p:txBody>
       </p:sp>
       <p:sp>
@@ -4249,23 +4235,22 @@
           <a:lstStyle/>
           <a:p>
             <a:pPr>
-              <a:defRPr sz="1000">
-                <a:latin typeface="궁서"/>
+              <a:defRPr sz="3000">
+                <a:latin typeface="함초름돋음"/>
               </a:defRPr>
             </a:pPr>
             <a:r>
               <a:t>부르고 불러도 한없이 소리쳐 대봐도</a:t>
             </a:r>
+            <a:br/>
+            <a:r>
+              <a:t>아무런 대답이 없는 널</a:t>
+            </a:r>
+            <a:br/>
             <a:r>
               <a:t/>
             </a:r>
           </a:p>
-          <a:p>
-            <a:r>
-              <a:t>아무런 대답이 없는 널</a:t>
-            </a:r>
-          </a:p>
-          <a:p/>
         </p:txBody>
       </p:sp>
       <p:sp>
@@ -4318,21 +4303,20 @@
           <a:bodyPr/>
           <a:lstStyle/>
           <a:p>
+            <a:br/>
             <a:pPr>
-              <a:defRPr sz="1000">
-                <a:latin typeface="궁서"/>
+              <a:defRPr sz="3000">
+                <a:latin typeface="함초름돋음"/>
               </a:defRPr>
             </a:pPr>
             <a:r>
+              <a:t>내 기억 속에서 너라는 사람의</a:t>
+            </a:r>
+            <a:br/>
+            <a:r>
               <a:t/>
             </a:r>
           </a:p>
-          <a:p>
-            <a:r>
-              <a:t>내 기억 속에서 너라는 사람의</a:t>
-            </a:r>
-          </a:p>
-          <a:p/>
         </p:txBody>
       </p:sp>
       <p:sp>
@@ -4386,23 +4370,22 @@
           <a:lstStyle/>
           <a:p>
             <a:pPr>
-              <a:defRPr sz="1000">
-                <a:latin typeface="궁서"/>
+              <a:defRPr sz="3000">
+                <a:latin typeface="함초름돋음"/>
               </a:defRPr>
             </a:pPr>
             <a:r>
               <a:t>존재를 완전히 지우려 끝없이 몸부림쳐 봐도</a:t>
             </a:r>
+            <a:br/>
+            <a:r>
+              <a:t>매일밤 꿈에서 그대가 나타나 흐르는 눈물을 닦아주는걸</a:t>
+            </a:r>
+            <a:br/>
             <a:r>
               <a:t/>
             </a:r>
           </a:p>
-          <a:p>
-            <a:r>
-              <a:t>매일밤 꿈에서 그대가 나타나 흐르는 눈물을 닦아주는걸</a:t>
-            </a:r>
-          </a:p>
-          <a:p/>
         </p:txBody>
       </p:sp>
       <p:sp>
@@ -4455,21 +4438,20 @@
           <a:bodyPr/>
           <a:lstStyle/>
           <a:p>
+            <a:br/>
             <a:pPr>
-              <a:defRPr sz="1000">
-                <a:latin typeface="궁서"/>
+              <a:defRPr sz="3000">
+                <a:latin typeface="함초름돋음"/>
               </a:defRPr>
             </a:pPr>
             <a:r>
+              <a:t>나 어떡하라고 다 끄떡없다고</a:t>
+            </a:r>
+            <a:br/>
+            <a:r>
               <a:t/>
             </a:r>
           </a:p>
-          <a:p>
-            <a:r>
-              <a:t>나 어떡하라고 다 끄떡없다고</a:t>
-            </a:r>
-          </a:p>
-          <a:p/>
         </p:txBody>
       </p:sp>
       <p:sp>
@@ -4523,23 +4505,22 @@
           <a:lstStyle/>
           <a:p>
             <a:pPr>
-              <a:defRPr sz="1000">
-                <a:latin typeface="궁서"/>
+              <a:defRPr sz="3000">
+                <a:latin typeface="함초름돋음"/>
               </a:defRPr>
             </a:pPr>
             <a:r>
               <a:t>거짓말 하라고 더는 못 참겠다고</a:t>
             </a:r>
+            <a:br/>
+            <a:r>
+              <a:t>나도 아플 땐 아프다고 슬플땐 슬프다고</a:t>
+            </a:r>
+            <a:br/>
             <a:r>
               <a:t/>
             </a:r>
           </a:p>
-          <a:p>
-            <a:r>
-              <a:t>나도 아플 땐 아프다고 슬플땐 슬프다고</a:t>
-            </a:r>
-          </a:p>
-          <a:p/>
         </p:txBody>
       </p:sp>
       <p:sp>
@@ -4593,23 +4574,22 @@
           <a:lstStyle/>
           <a:p>
             <a:pPr>
-              <a:defRPr sz="1000">
-                <a:latin typeface="궁서"/>
+              <a:defRPr sz="3000">
+                <a:latin typeface="함초름돋음"/>
               </a:defRPr>
             </a:pPr>
             <a:r>
               <a:t>얼어 붙은 심장이 자꾸만 내게로 고자질해</a:t>
             </a:r>
+            <a:br/>
+            <a:r>
+              <a:t>정말로 끝이라고 정말로 괜찮다고</a:t>
+            </a:r>
+            <a:br/>
             <a:r>
               <a:t/>
             </a:r>
           </a:p>
-          <a:p>
-            <a:r>
-              <a:t>정말로 끝이라고 정말로 괜찮다고</a:t>
-            </a:r>
-          </a:p>
-          <a:p/>
         </p:txBody>
       </p:sp>
       <p:sp>
@@ -4662,21 +4642,20 @@
           <a:bodyPr/>
           <a:lstStyle/>
           <a:p>
+            <a:br/>
             <a:pPr>
-              <a:defRPr sz="1000">
-                <a:latin typeface="궁서"/>
+              <a:defRPr sz="3000">
+                <a:latin typeface="함초름돋음"/>
               </a:defRPr>
             </a:pPr>
             <a:r>
+              <a:t>상처를 치료해줄 사람 어디 없나</a:t>
+            </a:r>
+            <a:br/>
+            <a:r>
               <a:t/>
             </a:r>
           </a:p>
-          <a:p>
-            <a:r>
-              <a:t>상처를 치료해줄 사람 어디 없나</a:t>
-            </a:r>
-          </a:p>
-          <a:p/>
         </p:txBody>
       </p:sp>
       <p:sp>
@@ -4730,19 +4709,19 @@
           <a:lstStyle/>
           <a:p>
             <a:pPr>
-              <a:defRPr sz="1000">
-                <a:latin typeface="궁서"/>
+              <a:defRPr sz="3000">
+                <a:latin typeface="함초름돋음"/>
               </a:defRPr>
             </a:pPr>
             <a:r>
               <a:t>꾹 참고 참았던 눈물이 자꾸만 내게로 쏟아지네</a:t>
             </a:r>
+            <a:br/>
+            <a:br/>
             <a:r>
               <a:t/>
             </a:r>
           </a:p>
-          <a:p/>
-          <a:p/>
         </p:txBody>
       </p:sp>
       <p:sp>
@@ -4796,23 +4775,22 @@
           <a:lstStyle/>
           <a:p>
             <a:pPr>
-              <a:defRPr sz="1000">
-                <a:latin typeface="궁서"/>
+              <a:defRPr sz="3000">
+                <a:latin typeface="함초름돋음"/>
               </a:defRPr>
             </a:pPr>
             <a:r>
               <a:t>상처를 치료해줄 사람 어디 없나</a:t>
             </a:r>
+            <a:br/>
+            <a:r>
+              <a:t>가만히 놔두다간 끊임없이 덧나</a:t>
+            </a:r>
+            <a:br/>
             <a:r>
               <a:t/>
             </a:r>
           </a:p>
-          <a:p>
-            <a:r>
-              <a:t>가만히 놔두다간 끊임없이 덧나</a:t>
-            </a:r>
-          </a:p>
-          <a:p/>
         </p:txBody>
       </p:sp>
       <p:sp>
@@ -4866,23 +4844,22 @@
           <a:lstStyle/>
           <a:p>
             <a:pPr>
-              <a:defRPr sz="1000">
-                <a:latin typeface="궁서"/>
+              <a:defRPr sz="3000">
+                <a:latin typeface="함초름돋음"/>
               </a:defRPr>
             </a:pPr>
             <a:r>
               <a:t>사랑도 사람도 너무나도 겁나</a:t>
             </a:r>
+            <a:br/>
+            <a:r>
+              <a:t>혼자인게 무서워 난 잊혀질까 두려워</a:t>
+            </a:r>
+            <a:br/>
             <a:r>
               <a:t/>
             </a:r>
           </a:p>
-          <a:p>
-            <a:r>
-              <a:t>혼자인게 무서워 난 잊혀질까 두려워</a:t>
-            </a:r>
-          </a:p>
-          <a:p/>
         </p:txBody>
       </p:sp>
       <p:sp>
@@ -4935,21 +4912,20 @@
           <a:bodyPr/>
           <a:lstStyle/>
           <a:p>
+            <a:br/>
             <a:pPr>
-              <a:defRPr sz="1000">
-                <a:latin typeface="궁서"/>
+              <a:defRPr sz="3000">
+                <a:latin typeface="함초름돋음"/>
               </a:defRPr>
             </a:pPr>
             <a:r>
+              <a:t>상처를 치료해줄 사람 어디 없나</a:t>
+            </a:r>
+            <a:br/>
+            <a:r>
               <a:t/>
             </a:r>
           </a:p>
-          <a:p>
-            <a:r>
-              <a:t>상처를 치료해줄 사람 어디 없나</a:t>
-            </a:r>
-          </a:p>
-          <a:p/>
         </p:txBody>
       </p:sp>
       <p:sp>
@@ -5003,23 +4979,22 @@
           <a:lstStyle/>
           <a:p>
             <a:pPr>
-              <a:defRPr sz="1000">
-                <a:latin typeface="궁서"/>
+              <a:defRPr sz="3000">
+                <a:latin typeface="함초름돋음"/>
               </a:defRPr>
             </a:pPr>
             <a:r>
               <a:t>가만히 놔두다간 끊임없이 덧나</a:t>
             </a:r>
+            <a:br/>
+            <a:r>
+              <a:t>사랑도 사람도 너무나도 겁나</a:t>
+            </a:r>
+            <a:br/>
             <a:r>
               <a:t/>
             </a:r>
           </a:p>
-          <a:p>
-            <a:r>
-              <a:t>사랑도 사람도 너무나도 겁나</a:t>
-            </a:r>
-          </a:p>
-          <a:p/>
         </p:txBody>
       </p:sp>
       <p:sp>
@@ -5073,19 +5048,19 @@
           <a:lstStyle/>
           <a:p>
             <a:pPr>
-              <a:defRPr sz="1000">
-                <a:latin typeface="궁서"/>
+              <a:defRPr sz="3000">
+                <a:latin typeface="함초름돋음"/>
               </a:defRPr>
             </a:pPr>
             <a:r>
               <a:t>혼자인게 무서워 난 잊혀질까 두려워</a:t>
             </a:r>
+            <a:br/>
+            <a:br/>
             <a:r>
               <a:t/>
             </a:r>
           </a:p>
-          <a:p/>
-          <a:p/>
         </p:txBody>
       </p:sp>
       <p:sp>
@@ -5139,23 +5114,22 @@
           <a:lstStyle/>
           <a:p>
             <a:pPr>
-              <a:defRPr sz="1000">
-                <a:latin typeface="궁서"/>
+              <a:defRPr sz="3000">
+                <a:latin typeface="함초름돋음"/>
               </a:defRPr>
             </a:pPr>
             <a:r>
               <a:t>언제나 외톨이 맘의 문을 닫고</a:t>
             </a:r>
+            <a:br/>
+            <a:r>
+              <a:t>슬픔을 등에 지고 살아가는 바보</a:t>
+            </a:r>
+            <a:br/>
             <a:r>
               <a:t/>
             </a:r>
           </a:p>
-          <a:p>
-            <a:r>
-              <a:t>슬픔을 등에 지고 살아가는 바보</a:t>
-            </a:r>
-          </a:p>
-          <a:p/>
         </p:txBody>
       </p:sp>
       <p:sp>
@@ -5209,23 +5183,22 @@
           <a:lstStyle/>
           <a:p>
             <a:pPr>
-              <a:defRPr sz="1000">
-                <a:latin typeface="궁서"/>
+              <a:defRPr sz="3000">
+                <a:latin typeface="함초름돋음"/>
               </a:defRPr>
             </a:pPr>
             <a:r>
               <a:t>두 눈을 감고 두 귀를 막고</a:t>
             </a:r>
+            <a:br/>
+            <a:r>
+              <a:t>캄캄한 어둠속에 내 자신을 가둬</a:t>
+            </a:r>
+            <a:br/>
             <a:r>
               <a:t/>
             </a:r>
           </a:p>
-          <a:p>
-            <a:r>
-              <a:t>캄캄한 어둠속에 내 자신을 가둬</a:t>
-            </a:r>
-          </a:p>
-          <a:p/>
         </p:txBody>
       </p:sp>
       <p:sp>
@@ -5278,21 +5251,20 @@
           <a:bodyPr/>
           <a:lstStyle/>
           <a:p>
+            <a:br/>
             <a:pPr>
-              <a:defRPr sz="1000">
-                <a:latin typeface="궁서"/>
+              <a:defRPr sz="3000">
+                <a:latin typeface="함초름돋음"/>
               </a:defRPr>
             </a:pPr>
             <a:r>
+              <a:t>언제나 외톨이 맘의 문을 닫고</a:t>
+            </a:r>
+            <a:br/>
+            <a:r>
               <a:t/>
             </a:r>
           </a:p>
-          <a:p>
-            <a:r>
-              <a:t>언제나 외톨이 맘의 문을 닫고</a:t>
-            </a:r>
-          </a:p>
-          <a:p/>
         </p:txBody>
       </p:sp>
       <p:sp>
@@ -5346,23 +5318,22 @@
           <a:lstStyle/>
           <a:p>
             <a:pPr>
-              <a:defRPr sz="1000">
-                <a:latin typeface="궁서"/>
+              <a:defRPr sz="3000">
+                <a:latin typeface="함초름돋음"/>
               </a:defRPr>
             </a:pPr>
             <a:r>
               <a:t>슬픔을 등에 지고 살아가는 바보</a:t>
             </a:r>
+            <a:br/>
+            <a:r>
+              <a:t>두 눈을 감고 두 귀를 막고</a:t>
+            </a:r>
+            <a:br/>
             <a:r>
               <a:t/>
             </a:r>
           </a:p>
-          <a:p>
-            <a:r>
-              <a:t>두 눈을 감고 두 귀를 막고</a:t>
-            </a:r>
-          </a:p>
-          <a:p/>
         </p:txBody>
       </p:sp>
       <p:sp>
@@ -5416,23 +5387,22 @@
           <a:lstStyle/>
           <a:p>
             <a:pPr>
-              <a:defRPr sz="1000">
-                <a:latin typeface="궁서"/>
+              <a:defRPr sz="3000">
+                <a:latin typeface="함초름돋음"/>
               </a:defRPr>
             </a:pPr>
             <a:r>
               <a:t>가만히 놔두다간 끊임없이 덧나</a:t>
             </a:r>
+            <a:br/>
+            <a:r>
+              <a:t>사랑도 사람도 너무나도 겁나</a:t>
+            </a:r>
+            <a:br/>
             <a:r>
               <a:t/>
             </a:r>
           </a:p>
-          <a:p>
-            <a:r>
-              <a:t>사랑도 사람도 너무나도 겁나</a:t>
-            </a:r>
-          </a:p>
-          <a:p/>
         </p:txBody>
       </p:sp>
       <p:sp>
@@ -5486,8 +5456,8 @@
           <a:lstStyle/>
           <a:p>
             <a:pPr>
-              <a:defRPr sz="1000">
-                <a:latin typeface="궁서"/>
+              <a:defRPr sz="3000">
+                <a:latin typeface="함초름돋음"/>
               </a:defRPr>
             </a:pPr>
             <a:r>
@@ -5550,19 +5520,19 @@
           <a:lstStyle/>
           <a:p>
             <a:pPr>
-              <a:defRPr sz="1000">
-                <a:latin typeface="궁서"/>
+              <a:defRPr sz="3000">
+                <a:latin typeface="함초름돋음"/>
               </a:defRPr>
             </a:pPr>
             <a:r>
               <a:t>혼자인게 무서워 난 잊혀질까 두려워</a:t>
             </a:r>
+            <a:br/>
+            <a:br/>
             <a:r>
               <a:t/>
             </a:r>
           </a:p>
-          <a:p/>
-          <a:p/>
         </p:txBody>
       </p:sp>
       <p:sp>
@@ -5616,23 +5586,22 @@
           <a:lstStyle/>
           <a:p>
             <a:pPr>
-              <a:defRPr sz="1000">
-                <a:latin typeface="궁서"/>
+              <a:defRPr sz="3000">
+                <a:latin typeface="함초름돋음"/>
               </a:defRPr>
             </a:pPr>
             <a:r>
               <a:t>언제나 외톨이 맘의 문을 닫고</a:t>
             </a:r>
+            <a:br/>
+            <a:r>
+              <a:t>슬픔을 등에 지고 살아가는 바보</a:t>
+            </a:r>
+            <a:br/>
             <a:r>
               <a:t/>
             </a:r>
           </a:p>
-          <a:p>
-            <a:r>
-              <a:t>슬픔을 등에 지고 살아가는 바보</a:t>
-            </a:r>
-          </a:p>
-          <a:p/>
         </p:txBody>
       </p:sp>
       <p:sp>
@@ -5686,23 +5655,22 @@
           <a:lstStyle/>
           <a:p>
             <a:pPr>
-              <a:defRPr sz="1000">
-                <a:latin typeface="궁서"/>
+              <a:defRPr sz="3000">
+                <a:latin typeface="함초름돋음"/>
               </a:defRPr>
             </a:pPr>
             <a:r>
               <a:t>두 눈을 감고 두 귀를 막고</a:t>
             </a:r>
+            <a:br/>
+            <a:r>
+              <a:t>캄캄한 어둠속에 내 자신을 가둬</a:t>
+            </a:r>
+            <a:br/>
             <a:r>
               <a:t/>
             </a:r>
           </a:p>
-          <a:p>
-            <a:r>
-              <a:t>캄캄한 어둠속에 내 자신을 가둬</a:t>
-            </a:r>
-          </a:p>
-          <a:p/>
         </p:txBody>
       </p:sp>
       <p:sp>
@@ -5755,21 +5723,20 @@
           <a:bodyPr/>
           <a:lstStyle/>
           <a:p>
+            <a:br/>
             <a:pPr>
-              <a:defRPr sz="1000">
-                <a:latin typeface="궁서"/>
+              <a:defRPr sz="3000">
+                <a:latin typeface="함초름돋음"/>
               </a:defRPr>
             </a:pPr>
             <a:r>
+              <a:t>365일 1년 내내</a:t>
+            </a:r>
+            <a:br/>
+            <a:r>
               <a:t/>
             </a:r>
           </a:p>
-          <a:p>
-            <a:r>
-              <a:t>365일 1년 내내</a:t>
-            </a:r>
-          </a:p>
-          <a:p/>
         </p:txBody>
       </p:sp>
       <p:sp>
@@ -5823,23 +5790,22 @@
           <a:lstStyle/>
           <a:p>
             <a:pPr>
-              <a:defRPr sz="1000">
-                <a:latin typeface="궁서"/>
+              <a:defRPr sz="3000">
+                <a:latin typeface="함초름돋음"/>
               </a:defRPr>
             </a:pPr>
             <a:r>
               <a:t>방황하는 내 영혼의 조작 키를 잡은 Jack Sparrow</a:t>
             </a:r>
+            <a:br/>
+            <a:r>
+              <a:t>몰아치는 Hurricane 졸라매는 허리끈에</a:t>
+            </a:r>
+            <a:br/>
             <a:r>
               <a:t/>
             </a:r>
           </a:p>
-          <a:p>
-            <a:r>
-              <a:t>몰아치는 Hurricane 졸라매는 허리끈에</a:t>
-            </a:r>
-          </a:p>
-          <a:p/>
         </p:txBody>
       </p:sp>
       <p:sp>

</xml_diff>

<commit_message>
delete second line \n at lyric box
</commit_message>
<xml_diff>
--- a/Slide/add all slides1.pptx
+++ b/Slide/add all slides1.pptx
@@ -3154,7 +3154,6 @@
             <a:r>
               <a:t>가만히 놔두다간 끊임없이 덧나</a:t>
             </a:r>
-            <a:br/>
             <a:r>
               <a:t/>
             </a:r>
@@ -3223,7 +3222,6 @@
             <a:r>
               <a:t>내 안에 숨어 있는 또 다른 나와 싸워</a:t>
             </a:r>
-            <a:br/>
             <a:r>
               <a:t/>
             </a:r>
@@ -3292,7 +3290,6 @@
             <a:r>
               <a:t>너는 곁에 있어도 있는 게 아닌것 같다고</a:t>
             </a:r>
-            <a:br/>
             <a:r>
               <a:t/>
             </a:r>
@@ -3361,7 +3358,6 @@
             <a:r>
               <a:t>심장이 얼어붙은 차가웠던 사랑</a:t>
             </a:r>
-            <a:br/>
             <a:r>
               <a:t/>
             </a:r>
@@ -3430,7 +3426,6 @@
             <a:r>
               <a:t>매일 매일이 너무나 두려워</a:t>
             </a:r>
-            <a:br/>
             <a:r>
               <a:t/>
             </a:r>
@@ -3496,7 +3491,6 @@
               <a:t>M'aider누가 날 좀 꺼내줘</a:t>
             </a:r>
             <a:br/>
-            <a:br/>
             <a:r>
               <a:t/>
             </a:r>
@@ -3565,7 +3559,6 @@
             <a:r>
               <a:t>슬픔을 등에 지고 살아가는 바보</a:t>
             </a:r>
-            <a:br/>
             <a:r>
               <a:t/>
             </a:r>
@@ -3634,7 +3627,6 @@
             <a:r>
               <a:t>캄캄한 어둠속에 내 자신을 가둬</a:t>
             </a:r>
-            <a:br/>
             <a:r>
               <a:t/>
             </a:r>
@@ -3700,7 +3692,6 @@
             <a:r>
               <a:t>언제나 외톨이 맘의 문을 닫고</a:t>
             </a:r>
-            <a:br/>
             <a:r>
               <a:t/>
             </a:r>
@@ -3769,7 +3760,6 @@
             <a:r>
               <a:t>두 눈을 감고 두 귀를 막고</a:t>
             </a:r>
-            <a:br/>
             <a:r>
               <a:t/>
             </a:r>
@@ -3835,7 +3825,6 @@
               <a:t>캄캄한 어둠속에 내 자신을 가둬</a:t>
             </a:r>
             <a:br/>
-            <a:br/>
             <a:r>
               <a:t/>
             </a:r>
@@ -3904,7 +3893,6 @@
             <a:r>
               <a:t>혼자인게 무서워 난 잊혀질까 두려워</a:t>
             </a:r>
-            <a:br/>
             <a:r>
               <a:t/>
             </a:r>
@@ -3973,7 +3961,6 @@
             <a:r>
               <a:t>또 다시 혼자가 되는게 두려워 외면했었네</a:t>
             </a:r>
-            <a:br/>
             <a:r>
               <a:t/>
             </a:r>
@@ -4042,7 +4029,6 @@
             <a:r>
               <a:t>되돌아오기를 바라며 간절한 맘으로 밤마다 기도했었네</a:t>
             </a:r>
-            <a:br/>
             <a:r>
               <a:t/>
             </a:r>
@@ -4108,7 +4094,6 @@
             <a:r>
               <a:t>시위를 당기고 내 손을 떠나간 추억의 화살이</a:t>
             </a:r>
-            <a:br/>
             <a:r>
               <a:t/>
             </a:r>
@@ -4177,7 +4162,6 @@
             <a:r>
               <a:t>내게로 돌아와 달라고 내 손을 붙잡아 달라고</a:t>
             </a:r>
-            <a:br/>
             <a:r>
               <a:t/>
             </a:r>
@@ -4246,7 +4230,6 @@
             <a:r>
               <a:t>아무런 대답이 없는 널</a:t>
             </a:r>
-            <a:br/>
             <a:r>
               <a:t/>
             </a:r>
@@ -4312,7 +4295,6 @@
             <a:r>
               <a:t>내 기억 속에서 너라는 사람의</a:t>
             </a:r>
-            <a:br/>
             <a:r>
               <a:t/>
             </a:r>
@@ -4381,7 +4363,6 @@
             <a:r>
               <a:t>매일밤 꿈에서 그대가 나타나 흐르는 눈물을 닦아주는걸</a:t>
             </a:r>
-            <a:br/>
             <a:r>
               <a:t/>
             </a:r>
@@ -4447,7 +4428,6 @@
             <a:r>
               <a:t>나 어떡하라고 다 끄떡없다고</a:t>
             </a:r>
-            <a:br/>
             <a:r>
               <a:t/>
             </a:r>
@@ -4516,7 +4496,6 @@
             <a:r>
               <a:t>나도 아플 땐 아프다고 슬플땐 슬프다고</a:t>
             </a:r>
-            <a:br/>
             <a:r>
               <a:t/>
             </a:r>
@@ -4585,7 +4564,6 @@
             <a:r>
               <a:t>정말로 끝이라고 정말로 괜찮다고</a:t>
             </a:r>
-            <a:br/>
             <a:r>
               <a:t/>
             </a:r>
@@ -4651,7 +4629,6 @@
             <a:r>
               <a:t>상처를 치료해줄 사람 어디 없나</a:t>
             </a:r>
-            <a:br/>
             <a:r>
               <a:t/>
             </a:r>
@@ -4717,7 +4694,6 @@
               <a:t>꾹 참고 참았던 눈물이 자꾸만 내게로 쏟아지네</a:t>
             </a:r>
             <a:br/>
-            <a:br/>
             <a:r>
               <a:t/>
             </a:r>
@@ -4786,7 +4762,6 @@
             <a:r>
               <a:t>가만히 놔두다간 끊임없이 덧나</a:t>
             </a:r>
-            <a:br/>
             <a:r>
               <a:t/>
             </a:r>
@@ -4855,7 +4830,6 @@
             <a:r>
               <a:t>혼자인게 무서워 난 잊혀질까 두려워</a:t>
             </a:r>
-            <a:br/>
             <a:r>
               <a:t/>
             </a:r>
@@ -4921,7 +4895,6 @@
             <a:r>
               <a:t>상처를 치료해줄 사람 어디 없나</a:t>
             </a:r>
-            <a:br/>
             <a:r>
               <a:t/>
             </a:r>
@@ -4990,7 +4963,6 @@
             <a:r>
               <a:t>사랑도 사람도 너무나도 겁나</a:t>
             </a:r>
-            <a:br/>
             <a:r>
               <a:t/>
             </a:r>
@@ -5056,7 +5028,6 @@
               <a:t>혼자인게 무서워 난 잊혀질까 두려워</a:t>
             </a:r>
             <a:br/>
-            <a:br/>
             <a:r>
               <a:t/>
             </a:r>
@@ -5125,7 +5096,6 @@
             <a:r>
               <a:t>슬픔을 등에 지고 살아가는 바보</a:t>
             </a:r>
-            <a:br/>
             <a:r>
               <a:t/>
             </a:r>
@@ -5194,7 +5164,6 @@
             <a:r>
               <a:t>캄캄한 어둠속에 내 자신을 가둬</a:t>
             </a:r>
-            <a:br/>
             <a:r>
               <a:t/>
             </a:r>
@@ -5260,7 +5229,6 @@
             <a:r>
               <a:t>언제나 외톨이 맘의 문을 닫고</a:t>
             </a:r>
-            <a:br/>
             <a:r>
               <a:t/>
             </a:r>
@@ -5329,7 +5297,6 @@
             <a:r>
               <a:t>두 눈을 감고 두 귀를 막고</a:t>
             </a:r>
-            <a:br/>
             <a:r>
               <a:t/>
             </a:r>
@@ -5398,7 +5365,6 @@
             <a:r>
               <a:t>사랑도 사람도 너무나도 겁나</a:t>
             </a:r>
-            <a:br/>
             <a:r>
               <a:t/>
             </a:r>
@@ -5528,7 +5494,6 @@
               <a:t>혼자인게 무서워 난 잊혀질까 두려워</a:t>
             </a:r>
             <a:br/>
-            <a:br/>
             <a:r>
               <a:t/>
             </a:r>
@@ -5597,7 +5562,6 @@
             <a:r>
               <a:t>슬픔을 등에 지고 살아가는 바보</a:t>
             </a:r>
-            <a:br/>
             <a:r>
               <a:t/>
             </a:r>
@@ -5666,7 +5630,6 @@
             <a:r>
               <a:t>캄캄한 어둠속에 내 자신을 가둬</a:t>
             </a:r>
-            <a:br/>
             <a:r>
               <a:t/>
             </a:r>
@@ -5732,7 +5695,6 @@
             <a:r>
               <a:t>365일 1년 내내</a:t>
             </a:r>
-            <a:br/>
             <a:r>
               <a:t/>
             </a:r>
@@ -5801,7 +5763,6 @@
             <a:r>
               <a:t>몰아치는 Hurricane 졸라매는 허리끈에</a:t>
             </a:r>
-            <a:br/>
             <a:r>
               <a:t/>
             </a:r>

</xml_diff>